<commit_message>
Diploma Presentation - 2
</commit_message>
<xml_diff>
--- a/Диплом_Бондарь.А.П._презентация.pptx
+++ b/Диплом_Бондарь.А.П._презентация.pptx
@@ -5,12 +5,13 @@
     <p:sldMasterId id="2147483648" r:id="rId1"/>
   </p:sldMasterIdLst>
   <p:notesMasterIdLst>
-    <p:notesMasterId r:id="rId5"/>
+    <p:notesMasterId r:id="rId6"/>
   </p:notesMasterIdLst>
   <p:sldIdLst>
     <p:sldId id="256" r:id="rId2"/>
     <p:sldId id="258" r:id="rId3"/>
     <p:sldId id="257" r:id="rId4"/>
+    <p:sldId id="259" r:id="rId5"/>
   </p:sldIdLst>
   <p:sldSz cx="12192000" cy="6858000"/>
   <p:notesSz cx="6858000" cy="9144000"/>
@@ -109,6 +110,11 @@
       </a:defRPr>
     </a:lvl9pPr>
   </p:defaultTextStyle>
+  <p:extLst>
+    <p:ext uri="{EFAFB233-063F-42B5-8137-9DF3F51BA10A}">
+      <p15:sldGuideLst xmlns:p15="http://schemas.microsoft.com/office/powerpoint/2012/main"/>
+    </p:ext>
+  </p:extLst>
 </p:presentation>
 </file>
 
@@ -3915,16 +3921,7 @@
                 </a:solidFill>
                 <a:cs typeface="Helvetica"/>
               </a:rPr>
-              <a:t>Бердник</a:t>
-            </a:r>
-            <a:r>
-              <a:rPr lang="uk-UA" sz="1400" dirty="0">
-                <a:solidFill>
-                  <a:prstClr val="white"/>
-                </a:solidFill>
-                <a:cs typeface="Helvetica"/>
-              </a:rPr>
-              <a:t> </a:t>
+              <a:t>Бердник </a:t>
             </a:r>
             <a:r>
               <a:rPr lang="uk-UA" sz="1400" dirty="0" smtClean="0">
@@ -4308,54 +4305,6 @@
           </a:p>
         </p:txBody>
       </p:sp>
-      <p:cxnSp>
-        <p:nvCxnSpPr>
-          <p:cNvPr id="20" name="Прямая соединительная линия 19"/>
-          <p:cNvCxnSpPr/>
-          <p:nvPr/>
-        </p:nvCxnSpPr>
-        <p:spPr>
-          <a:xfrm>
-            <a:off x="135662" y="-5168"/>
-            <a:ext cx="10633" cy="6858000"/>
-          </a:xfrm>
-          <a:prstGeom prst="line">
-            <a:avLst/>
-          </a:prstGeom>
-          <a:noFill/>
-          <a:ln w="9525" cap="rnd" cmpd="sng" algn="ctr">
-            <a:solidFill>
-              <a:sysClr val="windowText" lastClr="000000"/>
-            </a:solidFill>
-            <a:prstDash val="solid"/>
-          </a:ln>
-          <a:effectLst/>
-        </p:spPr>
-      </p:cxnSp>
-      <p:cxnSp>
-        <p:nvCxnSpPr>
-          <p:cNvPr id="21" name="Прямая соединительная линия 20"/>
-          <p:cNvCxnSpPr/>
-          <p:nvPr/>
-        </p:nvCxnSpPr>
-        <p:spPr>
-          <a:xfrm>
-            <a:off x="181081" y="-5168"/>
-            <a:ext cx="10633" cy="6858000"/>
-          </a:xfrm>
-          <a:prstGeom prst="line">
-            <a:avLst/>
-          </a:prstGeom>
-          <a:noFill/>
-          <a:ln w="9525" cap="rnd" cmpd="sng" algn="ctr">
-            <a:solidFill>
-              <a:sysClr val="windowText" lastClr="000000"/>
-            </a:solidFill>
-            <a:prstDash val="solid"/>
-          </a:ln>
-          <a:effectLst/>
-        </p:spPr>
-      </p:cxnSp>
     </p:spTree>
     <p:extLst>
       <p:ext uri="{BB962C8B-B14F-4D97-AF65-F5344CB8AC3E}">
@@ -4388,7 +4337,7 @@
       </p:grpSpPr>
       <p:sp>
         <p:nvSpPr>
-          <p:cNvPr id="4" name="Rectangle 11">
+          <p:cNvPr id="5" name="Rectangle 11">
             <a:extLst>
               <a:ext uri="{FF2B5EF4-FFF2-40B4-BE49-F238E27FC236}">
                 <a16:creationId xmlns:a16="http://schemas.microsoft.com/office/drawing/2014/main" id="{6601C6B5-FE1B-4D30-AAE7-B15C74BB80D2}"/>
@@ -4402,8 +4351,8 @@
         </p:nvSpPr>
         <p:spPr bwMode="auto">
           <a:xfrm>
-            <a:off x="2729870" y="366693"/>
-            <a:ext cx="6160314" cy="954107"/>
+            <a:off x="2911282" y="307141"/>
+            <a:ext cx="6160314" cy="523220"/>
           </a:xfrm>
           <a:prstGeom prst="rect">
             <a:avLst/>
@@ -4433,48 +4382,13 @@
               <a:defRPr/>
             </a:pPr>
             <a:r>
-              <a:rPr lang="ru-RU" sz="2800" dirty="0">
+              <a:rPr lang="ru-RU" sz="2800" dirty="0" smtClean="0">
                 <a:solidFill>
                   <a:prstClr val="white"/>
                 </a:solidFill>
                 <a:cs typeface="Helvetica" panose="020B0604020202020204" pitchFamily="34" charset="0"/>
               </a:rPr>
-              <a:t>КВАЛІФІКАЦІЙНА </a:t>
-            </a:r>
-            <a:r>
-              <a:rPr lang="ru-RU" sz="2800" dirty="0" smtClean="0">
-                <a:solidFill>
-                  <a:prstClr val="white"/>
-                </a:solidFill>
-                <a:cs typeface="Helvetica" panose="020B0604020202020204" pitchFamily="34" charset="0"/>
-              </a:rPr>
-              <a:t>РОБОТА</a:t>
-            </a:r>
-            <a:r>
-              <a:rPr lang="en-US" sz="2400" dirty="0" smtClean="0">
-                <a:solidFill>
-                  <a:prstClr val="white"/>
-                </a:solidFill>
-                <a:cs typeface="Helvetica" panose="020B0604020202020204" pitchFamily="34" charset="0"/>
-              </a:rPr>
-              <a:t/>
-            </a:r>
-            <a:br>
-              <a:rPr lang="en-US" sz="2400" dirty="0" smtClean="0">
-                <a:solidFill>
-                  <a:prstClr val="white"/>
-                </a:solidFill>
-                <a:cs typeface="Helvetica" panose="020B0604020202020204" pitchFamily="34" charset="0"/>
-              </a:rPr>
-            </a:br>
-            <a:r>
-              <a:rPr lang="ru-RU" sz="2800" dirty="0" smtClean="0">
-                <a:solidFill>
-                  <a:prstClr val="white"/>
-                </a:solidFill>
-                <a:cs typeface="Helvetica" panose="020B0604020202020204" pitchFamily="34" charset="0"/>
-              </a:rPr>
-              <a:t>бакалавра</a:t>
+              <a:t>Предметна область</a:t>
             </a:r>
             <a:endParaRPr lang="ru-RU" sz="2800" dirty="0">
               <a:solidFill>
@@ -4485,6 +4399,83 @@
           </a:p>
         </p:txBody>
       </p:sp>
+      <p:pic>
+        <p:nvPicPr>
+          <p:cNvPr id="3" name="Рисунок 2"/>
+          <p:cNvPicPr>
+            <a:picLocks noChangeAspect="1"/>
+          </p:cNvPicPr>
+          <p:nvPr/>
+        </p:nvPicPr>
+        <p:blipFill>
+          <a:blip r:embed="rId2">
+            <a:extLst>
+              <a:ext uri="{28A0092B-C50C-407E-A947-70E740481C1C}">
+                <a14:useLocalDpi xmlns:a14="http://schemas.microsoft.com/office/drawing/2010/main" val="0"/>
+              </a:ext>
+            </a:extLst>
+          </a:blip>
+          <a:stretch>
+            <a:fillRect/>
+          </a:stretch>
+        </p:blipFill>
+        <p:spPr>
+          <a:xfrm>
+            <a:off x="0" y="1798997"/>
+            <a:ext cx="3778681" cy="5059003"/>
+          </a:xfrm>
+          <a:prstGeom prst="rect">
+            <a:avLst/>
+          </a:prstGeom>
+        </p:spPr>
+      </p:pic>
+      <p:pic>
+        <p:nvPicPr>
+          <p:cNvPr id="7" name="Рисунок 6"/>
+          <p:cNvPicPr>
+            <a:picLocks noChangeAspect="1"/>
+          </p:cNvPicPr>
+          <p:nvPr/>
+        </p:nvPicPr>
+        <p:blipFill>
+          <a:blip r:embed="rId3"/>
+          <a:stretch>
+            <a:fillRect/>
+          </a:stretch>
+        </p:blipFill>
+        <p:spPr>
+          <a:xfrm>
+            <a:off x="3778680" y="1798996"/>
+            <a:ext cx="4425519" cy="5059003"/>
+          </a:xfrm>
+          <a:prstGeom prst="rect">
+            <a:avLst/>
+          </a:prstGeom>
+        </p:spPr>
+      </p:pic>
+      <p:pic>
+        <p:nvPicPr>
+          <p:cNvPr id="9" name="Рисунок 8"/>
+          <p:cNvPicPr>
+            <a:picLocks noChangeAspect="1"/>
+          </p:cNvPicPr>
+          <p:nvPr/>
+        </p:nvPicPr>
+        <p:blipFill rotWithShape="1">
+          <a:blip r:embed="rId4"/>
+          <a:srcRect t="6051"/>
+          <a:stretch/>
+        </p:blipFill>
+        <p:spPr>
+          <a:xfrm>
+            <a:off x="8204200" y="1803400"/>
+            <a:ext cx="3987800" cy="5054600"/>
+          </a:xfrm>
+          <a:prstGeom prst="rect">
+            <a:avLst/>
+          </a:prstGeom>
+        </p:spPr>
+      </p:pic>
     </p:spTree>
     <p:extLst>
       <p:ext uri="{BB962C8B-B14F-4D97-AF65-F5344CB8AC3E}">
@@ -4517,35 +4508,83 @@
       </p:grpSpPr>
       <p:sp>
         <p:nvSpPr>
-          <p:cNvPr id="12" name="Заголовок 1"/>
-          <p:cNvSpPr>
-            <a:spLocks noGrp="1"/>
-          </p:cNvSpPr>
-          <p:nvPr>
-            <p:ph type="ctrTitle"/>
-          </p:nvPr>
-        </p:nvSpPr>
-        <p:spPr>
+          <p:cNvPr id="3" name="Rectangle 11">
+            <a:extLst>
+              <a:ext uri="{FF2B5EF4-FFF2-40B4-BE49-F238E27FC236}">
+                <a16:creationId xmlns:a16="http://schemas.microsoft.com/office/drawing/2014/main" id="{6601C6B5-FE1B-4D30-AAE7-B15C74BB80D2}"/>
+              </a:ext>
+            </a:extLst>
+          </p:cNvPr>
+          <p:cNvSpPr>
+            <a:spLocks noChangeArrowheads="1"/>
+          </p:cNvSpPr>
+          <p:nvPr/>
+        </p:nvSpPr>
+        <p:spPr bwMode="auto">
           <a:xfrm>
-            <a:off x="1512124" y="647349"/>
-            <a:ext cx="9144000" cy="5171559"/>
+            <a:off x="3124199" y="275859"/>
+            <a:ext cx="6160314" cy="523220"/>
           </a:xfrm>
-          <a:solidFill>
-            <a:srgbClr val="CCECFF">
-              <a:alpha val="74118"/>
-            </a:srgbClr>
-          </a:solidFill>
-          <a:ln w="38100">
-            <a:solidFill>
-              <a:schemeClr val="accent2"/>
-            </a:solidFill>
+          <a:prstGeom prst="rect">
+            <a:avLst/>
+          </a:prstGeom>
+          <a:noFill/>
+          <a:ln w="9525">
+            <a:noFill/>
+            <a:miter lim="800000"/>
+            <a:headEnd/>
+            <a:tailEnd/>
           </a:ln>
+          <a:effectLst>
+            <a:outerShdw blurRad="50800" dist="38100" dir="2700000" algn="tl" rotWithShape="0">
+              <a:prstClr val="black">
+                <a:alpha val="40000"/>
+              </a:prstClr>
+            </a:outerShdw>
+          </a:effectLst>
         </p:spPr>
         <p:txBody>
-          <a:bodyPr/>
-          <a:lstStyle/>
-          <a:p>
-            <a:endParaRPr lang="en-US" dirty="0">
+          <a:bodyPr wrap="square">
+            <a:spAutoFit/>
+          </a:bodyPr>
+          <a:lstStyle/>
+          <a:p>
+            <a:pPr algn="ctr">
+              <a:defRPr/>
+            </a:pPr>
+            <a:r>
+              <a:rPr lang="ru-RU" sz="2800" dirty="0">
+                <a:solidFill>
+                  <a:schemeClr val="bg1"/>
+                </a:solidFill>
+              </a:rPr>
+              <a:t>Мета </a:t>
+            </a:r>
+            <a:r>
+              <a:rPr lang="ru-RU" sz="2800" dirty="0" err="1">
+                <a:solidFill>
+                  <a:schemeClr val="bg1"/>
+                </a:solidFill>
+              </a:rPr>
+              <a:t>кваліфікаційної</a:t>
+            </a:r>
+            <a:r>
+              <a:rPr lang="ru-RU" sz="2800" dirty="0">
+                <a:solidFill>
+                  <a:schemeClr val="bg1"/>
+                </a:solidFill>
+              </a:rPr>
+              <a:t> </a:t>
+            </a:r>
+            <a:r>
+              <a:rPr lang="ru-RU" sz="2800" dirty="0" err="1" smtClean="0">
+                <a:solidFill>
+                  <a:schemeClr val="bg1"/>
+                </a:solidFill>
+              </a:rPr>
+              <a:t>роботи</a:t>
+            </a:r>
+            <a:endParaRPr lang="ru-RU" sz="2800" dirty="0" smtClean="0">
               <a:solidFill>
                 <a:schemeClr val="bg1"/>
               </a:solidFill>
@@ -4553,10 +4592,647 @@
           </a:p>
         </p:txBody>
       </p:sp>
+      <p:sp>
+        <p:nvSpPr>
+          <p:cNvPr id="5" name="Rectangle 11">
+            <a:extLst>
+              <a:ext uri="{FF2B5EF4-FFF2-40B4-BE49-F238E27FC236}">
+                <a16:creationId xmlns:a16="http://schemas.microsoft.com/office/drawing/2014/main" id="{6601C6B5-FE1B-4D30-AAE7-B15C74BB80D2}"/>
+              </a:ext>
+            </a:extLst>
+          </p:cNvPr>
+          <p:cNvSpPr>
+            <a:spLocks noChangeArrowheads="1"/>
+          </p:cNvSpPr>
+          <p:nvPr/>
+        </p:nvSpPr>
+        <p:spPr bwMode="auto">
+          <a:xfrm>
+            <a:off x="2043475" y="1002311"/>
+            <a:ext cx="7538309" cy="1200329"/>
+          </a:xfrm>
+          <a:prstGeom prst="rect">
+            <a:avLst/>
+          </a:prstGeom>
+          <a:noFill/>
+          <a:ln w="9525">
+            <a:noFill/>
+            <a:miter lim="800000"/>
+            <a:headEnd/>
+            <a:tailEnd/>
+          </a:ln>
+          <a:effectLst>
+            <a:outerShdw blurRad="50800" dist="38100" dir="2700000" algn="tl" rotWithShape="0">
+              <a:prstClr val="black">
+                <a:alpha val="40000"/>
+              </a:prstClr>
+            </a:outerShdw>
+          </a:effectLst>
+        </p:spPr>
+        <p:txBody>
+          <a:bodyPr wrap="square">
+            <a:spAutoFit/>
+          </a:bodyPr>
+          <a:lstStyle/>
+          <a:p>
+            <a:pPr algn="just">
+              <a:defRPr/>
+            </a:pPr>
+            <a:r>
+              <a:rPr lang="ru-RU" sz="2400" dirty="0" err="1" smtClean="0">
+                <a:solidFill>
+                  <a:schemeClr val="bg1"/>
+                </a:solidFill>
+              </a:rPr>
+              <a:t>Створення</a:t>
+            </a:r>
+            <a:r>
+              <a:rPr lang="ru-RU" sz="2400" dirty="0" smtClean="0">
+                <a:solidFill>
+                  <a:schemeClr val="bg1"/>
+                </a:solidFill>
+              </a:rPr>
+              <a:t> </a:t>
+            </a:r>
+            <a:r>
+              <a:rPr lang="ru-RU" sz="2400" dirty="0" err="1">
+                <a:solidFill>
+                  <a:schemeClr val="bg1"/>
+                </a:solidFill>
+              </a:rPr>
+              <a:t>ігрового</a:t>
+            </a:r>
+            <a:r>
+              <a:rPr lang="ru-RU" sz="2400" dirty="0">
+                <a:solidFill>
+                  <a:schemeClr val="bg1"/>
+                </a:solidFill>
+              </a:rPr>
+              <a:t> </a:t>
+            </a:r>
+            <a:r>
+              <a:rPr lang="ru-RU" sz="2400" dirty="0" err="1">
+                <a:solidFill>
+                  <a:schemeClr val="bg1"/>
+                </a:solidFill>
+              </a:rPr>
+              <a:t>додатку</a:t>
+            </a:r>
+            <a:r>
+              <a:rPr lang="ru-RU" sz="2400" dirty="0">
+                <a:solidFill>
+                  <a:schemeClr val="bg1"/>
+                </a:solidFill>
+              </a:rPr>
+              <a:t> </a:t>
+            </a:r>
+            <a:r>
+              <a:rPr lang="ru-RU" sz="2400" dirty="0" err="1">
+                <a:solidFill>
+                  <a:schemeClr val="bg1"/>
+                </a:solidFill>
+              </a:rPr>
+              <a:t>зі</a:t>
+            </a:r>
+            <a:r>
+              <a:rPr lang="ru-RU" sz="2400" dirty="0">
+                <a:solidFill>
+                  <a:schemeClr val="bg1"/>
+                </a:solidFill>
+              </a:rPr>
+              <a:t> </a:t>
+            </a:r>
+            <a:r>
+              <a:rPr lang="ru-RU" sz="2400" dirty="0" err="1">
+                <a:solidFill>
+                  <a:schemeClr val="bg1"/>
+                </a:solidFill>
+              </a:rPr>
+              <a:t>штучним</a:t>
+            </a:r>
+            <a:r>
+              <a:rPr lang="ru-RU" sz="2400" dirty="0">
+                <a:solidFill>
+                  <a:schemeClr val="bg1"/>
+                </a:solidFill>
+              </a:rPr>
+              <a:t> </a:t>
+            </a:r>
+            <a:r>
+              <a:rPr lang="ru-RU" sz="2400" dirty="0" err="1">
+                <a:solidFill>
+                  <a:schemeClr val="bg1"/>
+                </a:solidFill>
+              </a:rPr>
+              <a:t>інтелектом</a:t>
+            </a:r>
+            <a:r>
+              <a:rPr lang="ru-RU" sz="2400" dirty="0">
+                <a:solidFill>
+                  <a:schemeClr val="bg1"/>
+                </a:solidFill>
+              </a:rPr>
+              <a:t> </a:t>
+            </a:r>
+            <a:r>
+              <a:rPr lang="ru-RU" sz="2400" dirty="0" err="1">
+                <a:solidFill>
+                  <a:schemeClr val="bg1"/>
+                </a:solidFill>
+              </a:rPr>
+              <a:t>що</a:t>
+            </a:r>
+            <a:r>
+              <a:rPr lang="ru-RU" sz="2400" dirty="0">
+                <a:solidFill>
+                  <a:schemeClr val="bg1"/>
+                </a:solidFill>
+              </a:rPr>
+              <a:t> </a:t>
+            </a:r>
+            <a:r>
+              <a:rPr lang="ru-RU" sz="2400" dirty="0" err="1">
+                <a:solidFill>
+                  <a:schemeClr val="bg1"/>
+                </a:solidFill>
+              </a:rPr>
+              <a:t>зможе</a:t>
+            </a:r>
+            <a:r>
+              <a:rPr lang="ru-RU" sz="2400" dirty="0">
+                <a:solidFill>
+                  <a:schemeClr val="bg1"/>
+                </a:solidFill>
+              </a:rPr>
+              <a:t> </a:t>
+            </a:r>
+            <a:r>
+              <a:rPr lang="ru-RU" sz="2400" dirty="0" err="1">
+                <a:solidFill>
+                  <a:schemeClr val="bg1"/>
+                </a:solidFill>
+              </a:rPr>
+              <a:t>адаптуватися</a:t>
+            </a:r>
+            <a:r>
+              <a:rPr lang="ru-RU" sz="2400" dirty="0">
+                <a:solidFill>
+                  <a:schemeClr val="bg1"/>
+                </a:solidFill>
+              </a:rPr>
+              <a:t> </a:t>
+            </a:r>
+            <a:r>
+              <a:rPr lang="ru-RU" sz="2400" dirty="0" err="1">
+                <a:solidFill>
+                  <a:schemeClr val="bg1"/>
+                </a:solidFill>
+              </a:rPr>
+              <a:t>під</a:t>
+            </a:r>
+            <a:r>
+              <a:rPr lang="ru-RU" sz="2400" dirty="0">
+                <a:solidFill>
+                  <a:schemeClr val="bg1"/>
+                </a:solidFill>
+              </a:rPr>
+              <a:t> </a:t>
+            </a:r>
+            <a:r>
+              <a:rPr lang="ru-RU" sz="2400" dirty="0" err="1">
+                <a:solidFill>
+                  <a:schemeClr val="bg1"/>
+                </a:solidFill>
+              </a:rPr>
+              <a:t>довільну</a:t>
+            </a:r>
+            <a:r>
+              <a:rPr lang="ru-RU" sz="2400" dirty="0">
+                <a:solidFill>
+                  <a:schemeClr val="bg1"/>
+                </a:solidFill>
+              </a:rPr>
+              <a:t> </a:t>
+            </a:r>
+            <a:r>
+              <a:rPr lang="ru-RU" sz="2400" dirty="0" err="1">
+                <a:solidFill>
+                  <a:schemeClr val="bg1"/>
+                </a:solidFill>
+              </a:rPr>
+              <a:t>ігрову</a:t>
+            </a:r>
+            <a:r>
+              <a:rPr lang="ru-RU" sz="2400" dirty="0">
+                <a:solidFill>
+                  <a:schemeClr val="bg1"/>
+                </a:solidFill>
+              </a:rPr>
+              <a:t> </a:t>
+            </a:r>
+            <a:r>
+              <a:rPr lang="ru-RU" sz="2400" dirty="0" err="1">
+                <a:solidFill>
+                  <a:schemeClr val="bg1"/>
+                </a:solidFill>
+              </a:rPr>
+              <a:t>ситуацію</a:t>
+            </a:r>
+            <a:r>
+              <a:rPr lang="ru-RU" sz="2400" dirty="0">
+                <a:solidFill>
+                  <a:schemeClr val="bg1"/>
+                </a:solidFill>
+              </a:rPr>
+              <a:t> та </a:t>
+            </a:r>
+            <a:r>
+              <a:rPr lang="ru-RU" sz="2400" dirty="0" err="1">
+                <a:solidFill>
+                  <a:schemeClr val="bg1"/>
+                </a:solidFill>
+              </a:rPr>
+              <a:t>допоможе</a:t>
+            </a:r>
+            <a:r>
+              <a:rPr lang="ru-RU" sz="2400" dirty="0">
+                <a:solidFill>
+                  <a:schemeClr val="bg1"/>
+                </a:solidFill>
+              </a:rPr>
+              <a:t> </a:t>
+            </a:r>
+            <a:r>
+              <a:rPr lang="ru-RU" sz="2400" dirty="0" err="1">
+                <a:solidFill>
+                  <a:schemeClr val="bg1"/>
+                </a:solidFill>
+              </a:rPr>
+              <a:t>розвинути</a:t>
+            </a:r>
+            <a:r>
+              <a:rPr lang="ru-RU" sz="2400" dirty="0">
+                <a:solidFill>
+                  <a:schemeClr val="bg1"/>
+                </a:solidFill>
+              </a:rPr>
+              <a:t> </a:t>
+            </a:r>
+            <a:r>
+              <a:rPr lang="ru-RU" sz="2400" dirty="0" err="1">
+                <a:solidFill>
+                  <a:schemeClr val="bg1"/>
+                </a:solidFill>
+              </a:rPr>
+              <a:t>стратегічне</a:t>
+            </a:r>
+            <a:r>
+              <a:rPr lang="ru-RU" sz="2400" dirty="0">
+                <a:solidFill>
+                  <a:schemeClr val="bg1"/>
+                </a:solidFill>
+              </a:rPr>
+              <a:t> </a:t>
+            </a:r>
+            <a:r>
+              <a:rPr lang="ru-RU" sz="2400" dirty="0" err="1">
+                <a:solidFill>
+                  <a:schemeClr val="bg1"/>
+                </a:solidFill>
+              </a:rPr>
+              <a:t>мислення</a:t>
+            </a:r>
+            <a:r>
+              <a:rPr lang="ru-RU" sz="2400" dirty="0">
+                <a:solidFill>
+                  <a:schemeClr val="bg1"/>
+                </a:solidFill>
+              </a:rPr>
+              <a:t> </a:t>
+            </a:r>
+            <a:r>
+              <a:rPr lang="ru-RU" sz="2400" dirty="0" err="1">
+                <a:solidFill>
+                  <a:schemeClr val="bg1"/>
+                </a:solidFill>
+              </a:rPr>
+              <a:t>гравця</a:t>
+            </a:r>
+            <a:endParaRPr lang="ru-RU" sz="2400" dirty="0">
+              <a:solidFill>
+                <a:prstClr val="white"/>
+              </a:solidFill>
+              <a:cs typeface="Helvetica" panose="020B0604020202020204" pitchFamily="34" charset="0"/>
+            </a:endParaRPr>
+          </a:p>
+        </p:txBody>
+      </p:sp>
+      <p:pic>
+        <p:nvPicPr>
+          <p:cNvPr id="6" name="Рисунок 5"/>
+          <p:cNvPicPr>
+            <a:picLocks noChangeAspect="1"/>
+          </p:cNvPicPr>
+          <p:nvPr/>
+        </p:nvPicPr>
+        <p:blipFill>
+          <a:blip r:embed="rId2"/>
+          <a:stretch>
+            <a:fillRect/>
+          </a:stretch>
+        </p:blipFill>
+        <p:spPr>
+          <a:xfrm>
+            <a:off x="3124199" y="2647204"/>
+            <a:ext cx="5376862" cy="4210796"/>
+          </a:xfrm>
+          <a:prstGeom prst="rect">
+            <a:avLst/>
+          </a:prstGeom>
+        </p:spPr>
+      </p:pic>
     </p:spTree>
     <p:extLst>
       <p:ext uri="{BB962C8B-B14F-4D97-AF65-F5344CB8AC3E}">
         <p14:creationId xmlns:p14="http://schemas.microsoft.com/office/powerpoint/2010/main" val="659333005"/>
+      </p:ext>
+    </p:extLst>
+  </p:cSld>
+  <p:clrMapOvr>
+    <a:masterClrMapping/>
+  </p:clrMapOvr>
+</p:sld>
+</file>
+
+<file path=ppt/slides/slide4.xml><?xml version="1.0" encoding="utf-8"?>
+<p:sld xmlns:a="http://schemas.openxmlformats.org/drawingml/2006/main" xmlns:r="http://schemas.openxmlformats.org/officeDocument/2006/relationships" xmlns:p="http://schemas.openxmlformats.org/presentationml/2006/main">
+  <p:cSld>
+    <p:spTree>
+      <p:nvGrpSpPr>
+        <p:cNvPr id="1" name=""/>
+        <p:cNvGrpSpPr/>
+        <p:nvPr/>
+      </p:nvGrpSpPr>
+      <p:grpSpPr>
+        <a:xfrm>
+          <a:off x="0" y="0"/>
+          <a:ext cx="0" cy="0"/>
+          <a:chOff x="0" y="0"/>
+          <a:chExt cx="0" cy="0"/>
+        </a:xfrm>
+      </p:grpSpPr>
+      <p:sp>
+        <p:nvSpPr>
+          <p:cNvPr id="4" name="Rectangle 11">
+            <a:extLst>
+              <a:ext uri="{FF2B5EF4-FFF2-40B4-BE49-F238E27FC236}">
+                <a16:creationId xmlns:a16="http://schemas.microsoft.com/office/drawing/2014/main" id="{6601C6B5-FE1B-4D30-AAE7-B15C74BB80D2}"/>
+              </a:ext>
+            </a:extLst>
+          </p:cNvPr>
+          <p:cNvSpPr>
+            <a:spLocks noChangeArrowheads="1"/>
+          </p:cNvSpPr>
+          <p:nvPr/>
+        </p:nvSpPr>
+        <p:spPr bwMode="auto">
+          <a:xfrm>
+            <a:off x="2967017" y="492429"/>
+            <a:ext cx="6160314" cy="523220"/>
+          </a:xfrm>
+          <a:prstGeom prst="rect">
+            <a:avLst/>
+          </a:prstGeom>
+          <a:noFill/>
+          <a:ln w="9525">
+            <a:noFill/>
+            <a:miter lim="800000"/>
+            <a:headEnd/>
+            <a:tailEnd/>
+          </a:ln>
+          <a:effectLst>
+            <a:outerShdw blurRad="50800" dist="38100" dir="2700000" algn="tl" rotWithShape="0">
+              <a:prstClr val="black">
+                <a:alpha val="40000"/>
+              </a:prstClr>
+            </a:outerShdw>
+          </a:effectLst>
+        </p:spPr>
+        <p:txBody>
+          <a:bodyPr wrap="square">
+            <a:spAutoFit/>
+          </a:bodyPr>
+          <a:lstStyle/>
+          <a:p>
+            <a:pPr algn="ctr">
+              <a:defRPr/>
+            </a:pPr>
+            <a:r>
+              <a:rPr lang="ru-RU" sz="2800" dirty="0" smtClean="0">
+                <a:solidFill>
+                  <a:schemeClr val="bg1"/>
+                </a:solidFill>
+              </a:rPr>
+              <a:t>Постановка </a:t>
+            </a:r>
+            <a:r>
+              <a:rPr lang="ru-RU" sz="2800" dirty="0" err="1" smtClean="0">
+                <a:solidFill>
+                  <a:schemeClr val="bg1"/>
+                </a:solidFill>
+              </a:rPr>
+              <a:t>завдання</a:t>
+            </a:r>
+            <a:endParaRPr lang="ru-RU" sz="2800" dirty="0" smtClean="0">
+              <a:solidFill>
+                <a:schemeClr val="bg1"/>
+              </a:solidFill>
+            </a:endParaRPr>
+          </a:p>
+        </p:txBody>
+      </p:sp>
+      <p:sp>
+        <p:nvSpPr>
+          <p:cNvPr id="5" name="Прямоугольник 4"/>
+          <p:cNvSpPr/>
+          <p:nvPr/>
+        </p:nvSpPr>
+        <p:spPr>
+          <a:xfrm>
+            <a:off x="1641754" y="1592239"/>
+            <a:ext cx="8810839" cy="3416320"/>
+          </a:xfrm>
+          <a:prstGeom prst="rect">
+            <a:avLst/>
+          </a:prstGeom>
+        </p:spPr>
+        <p:txBody>
+          <a:bodyPr wrap="square">
+            <a:spAutoFit/>
+          </a:bodyPr>
+          <a:lstStyle/>
+          <a:p>
+            <a:pPr marL="342900" indent="-342900" algn="just">
+              <a:lnSpc>
+                <a:spcPct val="150000"/>
+              </a:lnSpc>
+              <a:spcAft>
+                <a:spcPts val="0"/>
+              </a:spcAft>
+              <a:buFont typeface="Arial" panose="020B0604020202020204" pitchFamily="34" charset="0"/>
+              <a:buChar char="•"/>
+            </a:pPr>
+            <a:r>
+              <a:rPr lang="uk-UA" sz="2400" dirty="0" smtClean="0">
+                <a:solidFill>
+                  <a:schemeClr val="bg1"/>
+                </a:solidFill>
+                <a:ea typeface="Times New Roman" panose="02020603050405020304" pitchFamily="18" charset="0"/>
+              </a:rPr>
+              <a:t>Процедурна генерація ландшафту;</a:t>
+            </a:r>
+          </a:p>
+          <a:p>
+            <a:pPr marL="342900" indent="-342900" algn="just">
+              <a:lnSpc>
+                <a:spcPct val="150000"/>
+              </a:lnSpc>
+              <a:spcAft>
+                <a:spcPts val="0"/>
+              </a:spcAft>
+              <a:buFont typeface="Arial" panose="020B0604020202020204" pitchFamily="34" charset="0"/>
+              <a:buChar char="•"/>
+            </a:pPr>
+            <a:r>
+              <a:rPr lang="uk-UA" sz="2400" dirty="0" smtClean="0">
+                <a:solidFill>
+                  <a:schemeClr val="bg1"/>
+                </a:solidFill>
+                <a:ea typeface="Times New Roman" panose="02020603050405020304" pitchFamily="18" charset="0"/>
+              </a:rPr>
+              <a:t>Пошук шляху, базований на</a:t>
+            </a:r>
+            <a:r>
+              <a:rPr lang="en-US" sz="2400" dirty="0" smtClean="0">
+                <a:solidFill>
+                  <a:schemeClr val="bg1"/>
+                </a:solidFill>
+                <a:ea typeface="Times New Roman" panose="02020603050405020304" pitchFamily="18" charset="0"/>
+              </a:rPr>
+              <a:t> Vector</a:t>
+            </a:r>
+            <a:r>
+              <a:rPr lang="uk-UA" sz="2400" dirty="0" smtClean="0">
+                <a:solidFill>
+                  <a:schemeClr val="bg1"/>
+                </a:solidFill>
+                <a:ea typeface="Times New Roman" panose="02020603050405020304" pitchFamily="18" charset="0"/>
+              </a:rPr>
+              <a:t> </a:t>
+            </a:r>
+            <a:r>
+              <a:rPr lang="en-US" sz="2400" dirty="0" smtClean="0">
+                <a:solidFill>
+                  <a:schemeClr val="bg1"/>
+                </a:solidFill>
+                <a:ea typeface="Times New Roman" panose="02020603050405020304" pitchFamily="18" charset="0"/>
+              </a:rPr>
+              <a:t>Flow Field;</a:t>
+            </a:r>
+            <a:endParaRPr lang="uk-UA" sz="2400" dirty="0" smtClean="0">
+              <a:solidFill>
+                <a:schemeClr val="bg1"/>
+              </a:solidFill>
+              <a:ea typeface="Times New Roman" panose="02020603050405020304" pitchFamily="18" charset="0"/>
+            </a:endParaRPr>
+          </a:p>
+          <a:p>
+            <a:pPr marL="342900" indent="-342900" algn="just">
+              <a:lnSpc>
+                <a:spcPct val="150000"/>
+              </a:lnSpc>
+              <a:spcAft>
+                <a:spcPts val="0"/>
+              </a:spcAft>
+              <a:buFont typeface="Arial" panose="020B0604020202020204" pitchFamily="34" charset="0"/>
+              <a:buChar char="•"/>
+            </a:pPr>
+            <a:r>
+              <a:rPr lang="uk-UA" sz="2400" dirty="0" smtClean="0">
+                <a:solidFill>
+                  <a:schemeClr val="bg1"/>
+                </a:solidFill>
+                <a:ea typeface="Calibri" panose="020F0502020204030204" pitchFamily="34" charset="0"/>
+              </a:rPr>
+              <a:t>Територіальна економічна складова стратегії;</a:t>
+            </a:r>
+          </a:p>
+          <a:p>
+            <a:pPr marL="342900" indent="-342900" algn="just">
+              <a:lnSpc>
+                <a:spcPct val="150000"/>
+              </a:lnSpc>
+              <a:spcAft>
+                <a:spcPts val="0"/>
+              </a:spcAft>
+              <a:buFont typeface="Arial" panose="020B0604020202020204" pitchFamily="34" charset="0"/>
+              <a:buChar char="•"/>
+            </a:pPr>
+            <a:r>
+              <a:rPr lang="uk-UA" sz="2400" dirty="0" smtClean="0">
+                <a:solidFill>
+                  <a:schemeClr val="bg1"/>
+                </a:solidFill>
+                <a:ea typeface="Calibri" panose="020F0502020204030204" pitchFamily="34" charset="0"/>
+              </a:rPr>
+              <a:t>Необхідність розвідки території мапи, що покрита «туманом війни»;</a:t>
+            </a:r>
+          </a:p>
+          <a:p>
+            <a:pPr marL="342900" indent="-342900" algn="just">
+              <a:lnSpc>
+                <a:spcPct val="150000"/>
+              </a:lnSpc>
+              <a:spcAft>
+                <a:spcPts val="0"/>
+              </a:spcAft>
+              <a:buFont typeface="Arial" panose="020B0604020202020204" pitchFamily="34" charset="0"/>
+              <a:buChar char="•"/>
+            </a:pPr>
+            <a:r>
+              <a:rPr lang="uk-UA" sz="2400" dirty="0" smtClean="0">
+                <a:solidFill>
+                  <a:schemeClr val="bg1"/>
+                </a:solidFill>
+                <a:ea typeface="Calibri" panose="020F0502020204030204" pitchFamily="34" charset="0"/>
+              </a:rPr>
+              <a:t>Розподілення ресурсів ШІ-агентом за допомогою </a:t>
+            </a:r>
+            <a:r>
+              <a:rPr lang="uk-UA" sz="2400" dirty="0" err="1" smtClean="0">
+                <a:solidFill>
+                  <a:schemeClr val="bg1"/>
+                </a:solidFill>
+                <a:ea typeface="Calibri" panose="020F0502020204030204" pitchFamily="34" charset="0"/>
+              </a:rPr>
+              <a:t>перцептрону</a:t>
+            </a:r>
+            <a:r>
+              <a:rPr lang="uk-UA" sz="2400" dirty="0" smtClean="0">
+                <a:solidFill>
+                  <a:schemeClr val="bg1"/>
+                </a:solidFill>
+                <a:ea typeface="Calibri" panose="020F0502020204030204" pitchFamily="34" charset="0"/>
+              </a:rPr>
+              <a:t>.</a:t>
+            </a:r>
+          </a:p>
+        </p:txBody>
+      </p:sp>
+    </p:spTree>
+    <p:extLst>
+      <p:ext uri="{BB962C8B-B14F-4D97-AF65-F5344CB8AC3E}">
+        <p14:creationId xmlns:p14="http://schemas.microsoft.com/office/powerpoint/2010/main" val="1843319406"/>
       </p:ext>
     </p:extLst>
   </p:cSld>

</xml_diff>

<commit_message>
Diploma Presentation - 3
</commit_message>
<xml_diff>
--- a/Диплом_Бондарь.А.П._презентация.pptx
+++ b/Диплом_Бондарь.А.П._презентация.pptx
@@ -5,13 +5,15 @@
     <p:sldMasterId id="2147483648" r:id="rId1"/>
   </p:sldMasterIdLst>
   <p:notesMasterIdLst>
-    <p:notesMasterId r:id="rId6"/>
+    <p:notesMasterId r:id="rId8"/>
   </p:notesMasterIdLst>
   <p:sldIdLst>
     <p:sldId id="256" r:id="rId2"/>
     <p:sldId id="258" r:id="rId3"/>
     <p:sldId id="257" r:id="rId4"/>
     <p:sldId id="259" r:id="rId5"/>
+    <p:sldId id="260" r:id="rId6"/>
+    <p:sldId id="261" r:id="rId7"/>
   </p:sldIdLst>
   <p:sldSz cx="12192000" cy="6858000"/>
   <p:notesSz cx="6858000" cy="9144000"/>
@@ -200,7 +202,7 @@
           <a:p>
             <a:fld id="{72CF6BD5-054A-48FB-81AA-9293C9F10E1B}" type="datetimeFigureOut">
               <a:rPr lang="en-US" smtClean="0"/>
-              <a:t>6/20/2021</a:t>
+              <a:t>6/21/2021</a:t>
             </a:fld>
             <a:endParaRPr lang="en-US"/>
           </a:p>
@@ -683,7 +685,7 @@
           <a:p>
             <a:fld id="{0A3580A5-E51A-419C-924A-F5F805045894}" type="datetimeFigureOut">
               <a:rPr lang="en-US" smtClean="0"/>
-              <a:t>6/20/2021</a:t>
+              <a:t>6/21/2021</a:t>
             </a:fld>
             <a:endParaRPr lang="en-US"/>
           </a:p>
@@ -853,7 +855,7 @@
           <a:p>
             <a:fld id="{0A3580A5-E51A-419C-924A-F5F805045894}" type="datetimeFigureOut">
               <a:rPr lang="en-US" smtClean="0"/>
-              <a:t>6/20/2021</a:t>
+              <a:t>6/21/2021</a:t>
             </a:fld>
             <a:endParaRPr lang="en-US"/>
           </a:p>
@@ -1033,7 +1035,7 @@
           <a:p>
             <a:fld id="{0A3580A5-E51A-419C-924A-F5F805045894}" type="datetimeFigureOut">
               <a:rPr lang="en-US" smtClean="0"/>
-              <a:t>6/20/2021</a:t>
+              <a:t>6/21/2021</a:t>
             </a:fld>
             <a:endParaRPr lang="en-US"/>
           </a:p>
@@ -1203,7 +1205,7 @@
           <a:p>
             <a:fld id="{0A3580A5-E51A-419C-924A-F5F805045894}" type="datetimeFigureOut">
               <a:rPr lang="en-US" smtClean="0"/>
-              <a:t>6/20/2021</a:t>
+              <a:t>6/21/2021</a:t>
             </a:fld>
             <a:endParaRPr lang="en-US"/>
           </a:p>
@@ -1449,7 +1451,7 @@
           <a:p>
             <a:fld id="{0A3580A5-E51A-419C-924A-F5F805045894}" type="datetimeFigureOut">
               <a:rPr lang="en-US" smtClean="0"/>
-              <a:t>6/20/2021</a:t>
+              <a:t>6/21/2021</a:t>
             </a:fld>
             <a:endParaRPr lang="en-US"/>
           </a:p>
@@ -1681,7 +1683,7 @@
           <a:p>
             <a:fld id="{0A3580A5-E51A-419C-924A-F5F805045894}" type="datetimeFigureOut">
               <a:rPr lang="en-US" smtClean="0"/>
-              <a:t>6/20/2021</a:t>
+              <a:t>6/21/2021</a:t>
             </a:fld>
             <a:endParaRPr lang="en-US"/>
           </a:p>
@@ -2048,7 +2050,7 @@
           <a:p>
             <a:fld id="{0A3580A5-E51A-419C-924A-F5F805045894}" type="datetimeFigureOut">
               <a:rPr lang="en-US" smtClean="0"/>
-              <a:t>6/20/2021</a:t>
+              <a:t>6/21/2021</a:t>
             </a:fld>
             <a:endParaRPr lang="en-US"/>
           </a:p>
@@ -2166,7 +2168,7 @@
           <a:p>
             <a:fld id="{0A3580A5-E51A-419C-924A-F5F805045894}" type="datetimeFigureOut">
               <a:rPr lang="en-US" smtClean="0"/>
-              <a:t>6/20/2021</a:t>
+              <a:t>6/21/2021</a:t>
             </a:fld>
             <a:endParaRPr lang="en-US"/>
           </a:p>
@@ -2261,7 +2263,7 @@
           <a:p>
             <a:fld id="{0A3580A5-E51A-419C-924A-F5F805045894}" type="datetimeFigureOut">
               <a:rPr lang="en-US" smtClean="0"/>
-              <a:t>6/20/2021</a:t>
+              <a:t>6/21/2021</a:t>
             </a:fld>
             <a:endParaRPr lang="en-US"/>
           </a:p>
@@ -2538,7 +2540,7 @@
           <a:p>
             <a:fld id="{0A3580A5-E51A-419C-924A-F5F805045894}" type="datetimeFigureOut">
               <a:rPr lang="en-US" smtClean="0"/>
-              <a:t>6/20/2021</a:t>
+              <a:t>6/21/2021</a:t>
             </a:fld>
             <a:endParaRPr lang="en-US"/>
           </a:p>
@@ -2791,7 +2793,7 @@
           <a:p>
             <a:fld id="{0A3580A5-E51A-419C-924A-F5F805045894}" type="datetimeFigureOut">
               <a:rPr lang="en-US" smtClean="0"/>
-              <a:t>6/20/2021</a:t>
+              <a:t>6/21/2021</a:t>
             </a:fld>
             <a:endParaRPr lang="en-US"/>
           </a:p>
@@ -3013,7 +3015,7 @@
           <a:p>
             <a:fld id="{0A3580A5-E51A-419C-924A-F5F805045894}" type="datetimeFigureOut">
               <a:rPr lang="en-US" smtClean="0"/>
-              <a:t>6/20/2021</a:t>
+              <a:t>6/21/2021</a:t>
             </a:fld>
             <a:endParaRPr lang="en-US"/>
           </a:p>
@@ -4315,6 +4317,13 @@
   <p:clrMapOvr>
     <a:masterClrMapping/>
   </p:clrMapOvr>
+  <p:timing>
+    <p:tnLst>
+      <p:par>
+        <p:cTn id="1" dur="indefinite" restart="never" nodeType="tmRoot"/>
+      </p:par>
+    </p:tnLst>
+  </p:timing>
 </p:sld>
 </file>
 
@@ -4486,6 +4495,13 @@
   <p:clrMapOvr>
     <a:masterClrMapping/>
   </p:clrMapOvr>
+  <p:timing>
+    <p:tnLst>
+      <p:par>
+        <p:cTn id="1" dur="indefinite" restart="never" nodeType="tmRoot"/>
+      </p:par>
+    </p:tnLst>
+  </p:timing>
 </p:sld>
 </file>
 
@@ -4961,6 +4977,13 @@
   <p:clrMapOvr>
     <a:masterClrMapping/>
   </p:clrMapOvr>
+  <p:timing>
+    <p:tnLst>
+      <p:par>
+        <p:cTn id="1" dur="indefinite" restart="never" nodeType="tmRoot"/>
+      </p:par>
+    </p:tnLst>
+  </p:timing>
 </p:sld>
 </file>
 
@@ -5239,6 +5262,862 @@
   <p:clrMapOvr>
     <a:masterClrMapping/>
   </p:clrMapOvr>
+  <p:timing>
+    <p:tnLst>
+      <p:par>
+        <p:cTn id="1" dur="indefinite" restart="never" nodeType="tmRoot"/>
+      </p:par>
+    </p:tnLst>
+  </p:timing>
+</p:sld>
+</file>
+
+<file path=ppt/slides/slide5.xml><?xml version="1.0" encoding="utf-8"?>
+<p:sld xmlns:a="http://schemas.openxmlformats.org/drawingml/2006/main" xmlns:r="http://schemas.openxmlformats.org/officeDocument/2006/relationships" xmlns:p="http://schemas.openxmlformats.org/presentationml/2006/main">
+  <p:cSld>
+    <p:spTree>
+      <p:nvGrpSpPr>
+        <p:cNvPr id="1" name=""/>
+        <p:cNvGrpSpPr/>
+        <p:nvPr/>
+      </p:nvGrpSpPr>
+      <p:grpSpPr>
+        <a:xfrm>
+          <a:off x="0" y="0"/>
+          <a:ext cx="0" cy="0"/>
+          <a:chOff x="0" y="0"/>
+          <a:chExt cx="0" cy="0"/>
+        </a:xfrm>
+      </p:grpSpPr>
+      <p:sp>
+        <p:nvSpPr>
+          <p:cNvPr id="4" name="Rectangle 11">
+            <a:extLst>
+              <a:ext uri="{FF2B5EF4-FFF2-40B4-BE49-F238E27FC236}">
+                <a16:creationId xmlns:a16="http://schemas.microsoft.com/office/drawing/2014/main" id="{6601C6B5-FE1B-4D30-AAE7-B15C74BB80D2}"/>
+              </a:ext>
+            </a:extLst>
+          </p:cNvPr>
+          <p:cNvSpPr>
+            <a:spLocks noChangeArrowheads="1"/>
+          </p:cNvSpPr>
+          <p:nvPr/>
+        </p:nvSpPr>
+        <p:spPr bwMode="auto">
+          <a:xfrm>
+            <a:off x="2967017" y="492429"/>
+            <a:ext cx="6160314" cy="523220"/>
+          </a:xfrm>
+          <a:prstGeom prst="rect">
+            <a:avLst/>
+          </a:prstGeom>
+          <a:noFill/>
+          <a:ln w="9525">
+            <a:noFill/>
+            <a:miter lim="800000"/>
+            <a:headEnd/>
+            <a:tailEnd/>
+          </a:ln>
+          <a:effectLst>
+            <a:outerShdw blurRad="50800" dist="38100" dir="2700000" algn="tl" rotWithShape="0">
+              <a:prstClr val="black">
+                <a:alpha val="40000"/>
+              </a:prstClr>
+            </a:outerShdw>
+          </a:effectLst>
+        </p:spPr>
+        <p:txBody>
+          <a:bodyPr wrap="square">
+            <a:spAutoFit/>
+          </a:bodyPr>
+          <a:lstStyle/>
+          <a:p>
+            <a:pPr algn="ctr">
+              <a:defRPr/>
+            </a:pPr>
+            <a:r>
+              <a:rPr lang="ru-RU" sz="2800" dirty="0" err="1" smtClean="0">
+                <a:solidFill>
+                  <a:schemeClr val="bg1"/>
+                </a:solidFill>
+              </a:rPr>
+              <a:t>Використані</a:t>
+            </a:r>
+            <a:r>
+              <a:rPr lang="ru-RU" sz="2800" dirty="0" smtClean="0">
+                <a:solidFill>
+                  <a:schemeClr val="bg1"/>
+                </a:solidFill>
+              </a:rPr>
+              <a:t> </a:t>
+            </a:r>
+            <a:r>
+              <a:rPr lang="ru-RU" sz="2800" dirty="0" err="1" smtClean="0">
+                <a:solidFill>
+                  <a:schemeClr val="bg1"/>
+                </a:solidFill>
+              </a:rPr>
+              <a:t>програмні</a:t>
+            </a:r>
+            <a:r>
+              <a:rPr lang="ru-RU" sz="2800" dirty="0" smtClean="0">
+                <a:solidFill>
+                  <a:schemeClr val="bg1"/>
+                </a:solidFill>
+              </a:rPr>
+              <a:t> </a:t>
+            </a:r>
+            <a:r>
+              <a:rPr lang="ru-RU" sz="2800" dirty="0" err="1" smtClean="0">
+                <a:solidFill>
+                  <a:schemeClr val="bg1"/>
+                </a:solidFill>
+              </a:rPr>
+              <a:t>засоби</a:t>
+            </a:r>
+            <a:endParaRPr lang="ru-RU" sz="2800" dirty="0" smtClean="0">
+              <a:solidFill>
+                <a:schemeClr val="bg1"/>
+              </a:solidFill>
+            </a:endParaRPr>
+          </a:p>
+        </p:txBody>
+      </p:sp>
+      <p:sp>
+        <p:nvSpPr>
+          <p:cNvPr id="5" name="Прямоугольник 4"/>
+          <p:cNvSpPr/>
+          <p:nvPr/>
+        </p:nvSpPr>
+        <p:spPr>
+          <a:xfrm>
+            <a:off x="1641754" y="1592239"/>
+            <a:ext cx="8810839" cy="3416320"/>
+          </a:xfrm>
+          <a:prstGeom prst="rect">
+            <a:avLst/>
+          </a:prstGeom>
+        </p:spPr>
+        <p:txBody>
+          <a:bodyPr wrap="square">
+            <a:spAutoFit/>
+          </a:bodyPr>
+          <a:lstStyle/>
+          <a:p>
+            <a:pPr marL="342900" indent="-342900" algn="just">
+              <a:lnSpc>
+                <a:spcPct val="150000"/>
+              </a:lnSpc>
+              <a:spcAft>
+                <a:spcPts val="0"/>
+              </a:spcAft>
+              <a:buFont typeface="Arial" panose="020B0604020202020204" pitchFamily="34" charset="0"/>
+              <a:buChar char="•"/>
+            </a:pPr>
+            <a:r>
+              <a:rPr lang="uk-UA" sz="2400" dirty="0" smtClean="0">
+                <a:solidFill>
+                  <a:schemeClr val="bg1"/>
+                </a:solidFill>
+                <a:ea typeface="Times New Roman" panose="02020603050405020304" pitchFamily="18" charset="0"/>
+              </a:rPr>
+              <a:t>Мова програмування </a:t>
+            </a:r>
+            <a:r>
+              <a:rPr lang="en-US" sz="2400" dirty="0" smtClean="0">
+                <a:solidFill>
+                  <a:schemeClr val="bg1"/>
+                </a:solidFill>
+                <a:ea typeface="Times New Roman" panose="02020603050405020304" pitchFamily="18" charset="0"/>
+              </a:rPr>
+              <a:t>C++;</a:t>
+            </a:r>
+            <a:endParaRPr lang="uk-UA" sz="2400" dirty="0" smtClean="0">
+              <a:solidFill>
+                <a:schemeClr val="bg1"/>
+              </a:solidFill>
+              <a:ea typeface="Times New Roman" panose="02020603050405020304" pitchFamily="18" charset="0"/>
+            </a:endParaRPr>
+          </a:p>
+          <a:p>
+            <a:pPr marL="342900" indent="-342900" algn="just">
+              <a:lnSpc>
+                <a:spcPct val="150000"/>
+              </a:lnSpc>
+              <a:spcAft>
+                <a:spcPts val="0"/>
+              </a:spcAft>
+              <a:buFont typeface="Arial" panose="020B0604020202020204" pitchFamily="34" charset="0"/>
+              <a:buChar char="•"/>
+            </a:pPr>
+            <a:r>
+              <a:rPr lang="uk-UA" sz="2400" dirty="0" smtClean="0">
+                <a:solidFill>
+                  <a:schemeClr val="bg1"/>
+                </a:solidFill>
+                <a:ea typeface="Times New Roman" panose="02020603050405020304" pitchFamily="18" charset="0"/>
+              </a:rPr>
+              <a:t>Бібліотека для створення ігрових додатків </a:t>
+            </a:r>
+            <a:r>
+              <a:rPr lang="en-US" sz="2400" dirty="0" err="1" smtClean="0">
+                <a:solidFill>
+                  <a:schemeClr val="bg1"/>
+                </a:solidFill>
+                <a:ea typeface="Times New Roman" panose="02020603050405020304" pitchFamily="18" charset="0"/>
+              </a:rPr>
+              <a:t>RayLib</a:t>
+            </a:r>
+            <a:r>
+              <a:rPr lang="en-US" sz="2400" dirty="0" smtClean="0">
+                <a:solidFill>
+                  <a:schemeClr val="bg1"/>
+                </a:solidFill>
+                <a:ea typeface="Times New Roman" panose="02020603050405020304" pitchFamily="18" charset="0"/>
+              </a:rPr>
+              <a:t>;</a:t>
+            </a:r>
+            <a:endParaRPr lang="uk-UA" sz="2400" dirty="0" smtClean="0">
+              <a:solidFill>
+                <a:schemeClr val="bg1"/>
+              </a:solidFill>
+              <a:ea typeface="Times New Roman" panose="02020603050405020304" pitchFamily="18" charset="0"/>
+            </a:endParaRPr>
+          </a:p>
+          <a:p>
+            <a:pPr marL="342900" indent="-342900" algn="just">
+              <a:lnSpc>
+                <a:spcPct val="150000"/>
+              </a:lnSpc>
+              <a:spcAft>
+                <a:spcPts val="0"/>
+              </a:spcAft>
+              <a:buFont typeface="Arial" panose="020B0604020202020204" pitchFamily="34" charset="0"/>
+              <a:buChar char="•"/>
+            </a:pPr>
+            <a:r>
+              <a:rPr lang="en-US" sz="2400" dirty="0" smtClean="0">
+                <a:solidFill>
+                  <a:schemeClr val="bg1"/>
+                </a:solidFill>
+                <a:ea typeface="Calibri" panose="020F0502020204030204" pitchFamily="34" charset="0"/>
+              </a:rPr>
+              <a:t>API </a:t>
+            </a:r>
+            <a:r>
+              <a:rPr lang="uk-UA" sz="2400" dirty="0" smtClean="0">
+                <a:solidFill>
+                  <a:schemeClr val="bg1"/>
+                </a:solidFill>
+                <a:ea typeface="Calibri" panose="020F0502020204030204" pitchFamily="34" charset="0"/>
+              </a:rPr>
+              <a:t>для </a:t>
+            </a:r>
+            <a:r>
+              <a:rPr lang="uk-UA" sz="2400" dirty="0" err="1" smtClean="0">
+                <a:solidFill>
+                  <a:schemeClr val="bg1"/>
+                </a:solidFill>
+                <a:ea typeface="Calibri" panose="020F0502020204030204" pitchFamily="34" charset="0"/>
+              </a:rPr>
+              <a:t>багатопоточних</a:t>
+            </a:r>
+            <a:r>
+              <a:rPr lang="uk-UA" sz="2400" dirty="0" smtClean="0">
+                <a:solidFill>
+                  <a:schemeClr val="bg1"/>
+                </a:solidFill>
+                <a:ea typeface="Calibri" panose="020F0502020204030204" pitchFamily="34" charset="0"/>
+              </a:rPr>
+              <a:t> розрахунків </a:t>
+            </a:r>
+            <a:r>
+              <a:rPr lang="en-US" sz="2400" dirty="0" err="1" smtClean="0">
+                <a:solidFill>
+                  <a:schemeClr val="bg1"/>
+                </a:solidFill>
+                <a:ea typeface="Calibri" panose="020F0502020204030204" pitchFamily="34" charset="0"/>
+              </a:rPr>
+              <a:t>OpenMP</a:t>
+            </a:r>
+            <a:r>
+              <a:rPr lang="uk-UA" sz="2400" dirty="0" smtClean="0">
+                <a:solidFill>
+                  <a:schemeClr val="bg1"/>
+                </a:solidFill>
+                <a:ea typeface="Calibri" panose="020F0502020204030204" pitchFamily="34" charset="0"/>
+              </a:rPr>
+              <a:t>;</a:t>
+            </a:r>
+            <a:endParaRPr lang="uk-UA" sz="2400" dirty="0" smtClean="0">
+              <a:solidFill>
+                <a:schemeClr val="bg1"/>
+              </a:solidFill>
+              <a:ea typeface="Calibri" panose="020F0502020204030204" pitchFamily="34" charset="0"/>
+            </a:endParaRPr>
+          </a:p>
+          <a:p>
+            <a:pPr marL="342900" indent="-342900" algn="just">
+              <a:lnSpc>
+                <a:spcPct val="150000"/>
+              </a:lnSpc>
+              <a:spcAft>
+                <a:spcPts val="0"/>
+              </a:spcAft>
+              <a:buFont typeface="Arial" panose="020B0604020202020204" pitchFamily="34" charset="0"/>
+              <a:buChar char="•"/>
+            </a:pPr>
+            <a:r>
+              <a:rPr lang="uk-UA" sz="2400" dirty="0" smtClean="0">
+                <a:solidFill>
+                  <a:schemeClr val="bg1"/>
+                </a:solidFill>
+                <a:ea typeface="Calibri" panose="020F0502020204030204" pitchFamily="34" charset="0"/>
+              </a:rPr>
+              <a:t>Бібліотечна реалізація шуму </a:t>
+            </a:r>
+            <a:r>
+              <a:rPr lang="uk-UA" sz="2400" dirty="0" err="1" smtClean="0">
+                <a:solidFill>
+                  <a:schemeClr val="bg1"/>
+                </a:solidFill>
+                <a:ea typeface="Calibri" panose="020F0502020204030204" pitchFamily="34" charset="0"/>
+              </a:rPr>
+              <a:t>Перліна</a:t>
+            </a:r>
+            <a:r>
+              <a:rPr lang="uk-UA" sz="2400" dirty="0" smtClean="0">
+                <a:solidFill>
+                  <a:schemeClr val="bg1"/>
+                </a:solidFill>
+                <a:ea typeface="Calibri" panose="020F0502020204030204" pitchFamily="34" charset="0"/>
+              </a:rPr>
+              <a:t> </a:t>
+            </a:r>
+            <a:r>
+              <a:rPr lang="en-US" sz="2400" dirty="0" err="1">
+                <a:solidFill>
+                  <a:schemeClr val="bg1"/>
+                </a:solidFill>
+                <a:ea typeface="Calibri" panose="020F0502020204030204" pitchFamily="34" charset="0"/>
+              </a:rPr>
+              <a:t>siv</a:t>
+            </a:r>
+            <a:r>
+              <a:rPr lang="en-US" sz="2400" dirty="0">
+                <a:solidFill>
+                  <a:schemeClr val="bg1"/>
+                </a:solidFill>
+                <a:ea typeface="Calibri" panose="020F0502020204030204" pitchFamily="34" charset="0"/>
+              </a:rPr>
+              <a:t>::</a:t>
+            </a:r>
+            <a:r>
+              <a:rPr lang="en-US" sz="2400" dirty="0" err="1">
+                <a:solidFill>
+                  <a:schemeClr val="bg1"/>
+                </a:solidFill>
+                <a:ea typeface="Calibri" panose="020F0502020204030204" pitchFamily="34" charset="0"/>
+              </a:rPr>
+              <a:t>PerlinNoise</a:t>
+            </a:r>
+            <a:r>
+              <a:rPr lang="uk-UA" sz="2400" dirty="0" smtClean="0">
+                <a:solidFill>
+                  <a:schemeClr val="bg1"/>
+                </a:solidFill>
+                <a:ea typeface="Calibri" panose="020F0502020204030204" pitchFamily="34" charset="0"/>
+              </a:rPr>
+              <a:t>;</a:t>
+            </a:r>
+            <a:endParaRPr lang="uk-UA" sz="2400" dirty="0" smtClean="0">
+              <a:solidFill>
+                <a:schemeClr val="bg1"/>
+              </a:solidFill>
+              <a:ea typeface="Calibri" panose="020F0502020204030204" pitchFamily="34" charset="0"/>
+            </a:endParaRPr>
+          </a:p>
+          <a:p>
+            <a:pPr marL="342900" indent="-342900" algn="just">
+              <a:lnSpc>
+                <a:spcPct val="150000"/>
+              </a:lnSpc>
+              <a:spcAft>
+                <a:spcPts val="0"/>
+              </a:spcAft>
+              <a:buFont typeface="Arial" panose="020B0604020202020204" pitchFamily="34" charset="0"/>
+              <a:buChar char="•"/>
+            </a:pPr>
+            <a:r>
+              <a:rPr lang="uk-UA" sz="2400" dirty="0" smtClean="0">
+                <a:solidFill>
+                  <a:schemeClr val="bg1"/>
+                </a:solidFill>
+                <a:ea typeface="Calibri" panose="020F0502020204030204" pitchFamily="34" charset="0"/>
+              </a:rPr>
+              <a:t>Середа розробки</a:t>
+            </a:r>
+            <a:r>
+              <a:rPr lang="en-US" sz="2400" dirty="0" smtClean="0">
+                <a:solidFill>
+                  <a:schemeClr val="bg1"/>
+                </a:solidFill>
+                <a:ea typeface="Calibri" panose="020F0502020204030204" pitchFamily="34" charset="0"/>
+              </a:rPr>
+              <a:t> </a:t>
+            </a:r>
+            <a:r>
+              <a:rPr lang="en-US" sz="2400" dirty="0">
+                <a:solidFill>
+                  <a:schemeClr val="bg1"/>
+                </a:solidFill>
+                <a:ea typeface="Calibri" panose="020F0502020204030204" pitchFamily="34" charset="0"/>
+              </a:rPr>
+              <a:t>Microsoft Visual Studio 2019 </a:t>
+            </a:r>
+            <a:r>
+              <a:rPr lang="en-US" sz="2400" dirty="0" smtClean="0">
+                <a:solidFill>
+                  <a:schemeClr val="bg1"/>
+                </a:solidFill>
+                <a:ea typeface="Calibri" panose="020F0502020204030204" pitchFamily="34" charset="0"/>
+              </a:rPr>
+              <a:t>Community</a:t>
+            </a:r>
+            <a:r>
+              <a:rPr lang="uk-UA" sz="2400" dirty="0" smtClean="0">
+                <a:solidFill>
+                  <a:schemeClr val="bg1"/>
+                </a:solidFill>
+                <a:ea typeface="Calibri" panose="020F0502020204030204" pitchFamily="34" charset="0"/>
+              </a:rPr>
+              <a:t>;</a:t>
+            </a:r>
+          </a:p>
+          <a:p>
+            <a:pPr marL="342900" indent="-342900" algn="just">
+              <a:lnSpc>
+                <a:spcPct val="150000"/>
+              </a:lnSpc>
+              <a:spcAft>
+                <a:spcPts val="0"/>
+              </a:spcAft>
+              <a:buFont typeface="Arial" panose="020B0604020202020204" pitchFamily="34" charset="0"/>
+              <a:buChar char="•"/>
+            </a:pPr>
+            <a:r>
+              <a:rPr lang="uk-UA" sz="2400" dirty="0" smtClean="0">
+                <a:solidFill>
+                  <a:schemeClr val="bg1"/>
+                </a:solidFill>
+                <a:ea typeface="Calibri" panose="020F0502020204030204" pitchFamily="34" charset="0"/>
+              </a:rPr>
+              <a:t>Стандартна</a:t>
+            </a:r>
+            <a:r>
+              <a:rPr lang="en-US" sz="2400" dirty="0" smtClean="0">
+                <a:solidFill>
+                  <a:schemeClr val="bg1"/>
+                </a:solidFill>
+                <a:ea typeface="Calibri" panose="020F0502020204030204" pitchFamily="34" charset="0"/>
+              </a:rPr>
+              <a:t> </a:t>
+            </a:r>
+            <a:r>
+              <a:rPr lang="uk-UA" sz="2400" dirty="0">
+                <a:solidFill>
+                  <a:schemeClr val="bg1"/>
+                </a:solidFill>
+                <a:ea typeface="Calibri" panose="020F0502020204030204" pitchFamily="34" charset="0"/>
+              </a:rPr>
+              <a:t>б</a:t>
+            </a:r>
+            <a:r>
+              <a:rPr lang="uk-UA" sz="2400" dirty="0" smtClean="0">
+                <a:solidFill>
+                  <a:schemeClr val="bg1"/>
+                </a:solidFill>
+                <a:ea typeface="Calibri" panose="020F0502020204030204" pitchFamily="34" charset="0"/>
+              </a:rPr>
+              <a:t>ібліотека контейнерів </a:t>
+            </a:r>
+            <a:r>
+              <a:rPr lang="en-US" sz="2400" dirty="0" smtClean="0">
+                <a:solidFill>
+                  <a:schemeClr val="bg1"/>
+                </a:solidFill>
+                <a:ea typeface="Calibri" panose="020F0502020204030204" pitchFamily="34" charset="0"/>
+              </a:rPr>
+              <a:t>STL.</a:t>
+            </a:r>
+            <a:endParaRPr lang="uk-UA" sz="2400" dirty="0" smtClean="0">
+              <a:solidFill>
+                <a:schemeClr val="bg1"/>
+              </a:solidFill>
+              <a:ea typeface="Calibri" panose="020F0502020204030204" pitchFamily="34" charset="0"/>
+            </a:endParaRPr>
+          </a:p>
+        </p:txBody>
+      </p:sp>
+    </p:spTree>
+    <p:extLst>
+      <p:ext uri="{BB962C8B-B14F-4D97-AF65-F5344CB8AC3E}">
+        <p14:creationId xmlns:p14="http://schemas.microsoft.com/office/powerpoint/2010/main" val="1609234216"/>
+      </p:ext>
+    </p:extLst>
+  </p:cSld>
+  <p:clrMapOvr>
+    <a:masterClrMapping/>
+  </p:clrMapOvr>
+  <p:timing>
+    <p:tnLst>
+      <p:par>
+        <p:cTn id="1" dur="indefinite" restart="never" nodeType="tmRoot"/>
+      </p:par>
+    </p:tnLst>
+  </p:timing>
+</p:sld>
+</file>
+
+<file path=ppt/slides/slide6.xml><?xml version="1.0" encoding="utf-8"?>
+<p:sld xmlns:a="http://schemas.openxmlformats.org/drawingml/2006/main" xmlns:r="http://schemas.openxmlformats.org/officeDocument/2006/relationships" xmlns:p="http://schemas.openxmlformats.org/presentationml/2006/main">
+  <p:cSld>
+    <p:spTree>
+      <p:nvGrpSpPr>
+        <p:cNvPr id="1" name=""/>
+        <p:cNvGrpSpPr/>
+        <p:nvPr/>
+      </p:nvGrpSpPr>
+      <p:grpSpPr>
+        <a:xfrm>
+          <a:off x="0" y="0"/>
+          <a:ext cx="0" cy="0"/>
+          <a:chOff x="0" y="0"/>
+          <a:chExt cx="0" cy="0"/>
+        </a:xfrm>
+      </p:grpSpPr>
+      <p:sp>
+        <p:nvSpPr>
+          <p:cNvPr id="4" name="Rectangle 11">
+            <a:extLst>
+              <a:ext uri="{FF2B5EF4-FFF2-40B4-BE49-F238E27FC236}">
+                <a16:creationId xmlns:a16="http://schemas.microsoft.com/office/drawing/2014/main" id="{6601C6B5-FE1B-4D30-AAE7-B15C74BB80D2}"/>
+              </a:ext>
+            </a:extLst>
+          </p:cNvPr>
+          <p:cNvSpPr>
+            <a:spLocks noChangeArrowheads="1"/>
+          </p:cNvSpPr>
+          <p:nvPr/>
+        </p:nvSpPr>
+        <p:spPr bwMode="auto">
+          <a:xfrm>
+            <a:off x="2967017" y="492429"/>
+            <a:ext cx="6160314" cy="523220"/>
+          </a:xfrm>
+          <a:prstGeom prst="rect">
+            <a:avLst/>
+          </a:prstGeom>
+          <a:noFill/>
+          <a:ln w="9525">
+            <a:noFill/>
+            <a:miter lim="800000"/>
+            <a:headEnd/>
+            <a:tailEnd/>
+          </a:ln>
+          <a:effectLst>
+            <a:outerShdw blurRad="50800" dist="38100" dir="2700000" algn="tl" rotWithShape="0">
+              <a:prstClr val="black">
+                <a:alpha val="40000"/>
+              </a:prstClr>
+            </a:outerShdw>
+          </a:effectLst>
+        </p:spPr>
+        <p:txBody>
+          <a:bodyPr wrap="square">
+            <a:spAutoFit/>
+          </a:bodyPr>
+          <a:lstStyle/>
+          <a:p>
+            <a:pPr algn="ctr">
+              <a:defRPr/>
+            </a:pPr>
+            <a:r>
+              <a:rPr lang="ru-RU" sz="2800" dirty="0" err="1" smtClean="0">
+                <a:solidFill>
+                  <a:schemeClr val="bg1"/>
+                </a:solidFill>
+              </a:rPr>
+              <a:t>Використані</a:t>
+            </a:r>
+            <a:r>
+              <a:rPr lang="ru-RU" sz="2800" dirty="0" smtClean="0">
+                <a:solidFill>
+                  <a:schemeClr val="bg1"/>
+                </a:solidFill>
+              </a:rPr>
+              <a:t> </a:t>
+            </a:r>
+            <a:r>
+              <a:rPr lang="ru-RU" sz="2800" dirty="0" err="1" smtClean="0">
+                <a:solidFill>
+                  <a:schemeClr val="bg1"/>
+                </a:solidFill>
+              </a:rPr>
+              <a:t>апаратні</a:t>
+            </a:r>
+            <a:r>
+              <a:rPr lang="ru-RU" sz="2800" dirty="0" smtClean="0">
+                <a:solidFill>
+                  <a:schemeClr val="bg1"/>
+                </a:solidFill>
+              </a:rPr>
+              <a:t> </a:t>
+            </a:r>
+            <a:r>
+              <a:rPr lang="ru-RU" sz="2800" dirty="0" err="1" smtClean="0">
+                <a:solidFill>
+                  <a:schemeClr val="bg1"/>
+                </a:solidFill>
+              </a:rPr>
+              <a:t>засоби</a:t>
+            </a:r>
+            <a:endParaRPr lang="ru-RU" sz="2800" dirty="0" smtClean="0">
+              <a:solidFill>
+                <a:schemeClr val="bg1"/>
+              </a:solidFill>
+            </a:endParaRPr>
+          </a:p>
+        </p:txBody>
+      </p:sp>
+      <p:sp>
+        <p:nvSpPr>
+          <p:cNvPr id="5" name="Прямоугольник 4"/>
+          <p:cNvSpPr/>
+          <p:nvPr/>
+        </p:nvSpPr>
+        <p:spPr>
+          <a:xfrm>
+            <a:off x="403969" y="1781810"/>
+            <a:ext cx="8810839" cy="3416320"/>
+          </a:xfrm>
+          <a:prstGeom prst="rect">
+            <a:avLst/>
+          </a:prstGeom>
+        </p:spPr>
+        <p:txBody>
+          <a:bodyPr wrap="square">
+            <a:spAutoFit/>
+          </a:bodyPr>
+          <a:lstStyle/>
+          <a:p>
+            <a:pPr marL="342900" indent="-342900" algn="just">
+              <a:lnSpc>
+                <a:spcPct val="150000"/>
+              </a:lnSpc>
+              <a:spcAft>
+                <a:spcPts val="0"/>
+              </a:spcAft>
+              <a:buFont typeface="Arial" panose="020B0604020202020204" pitchFamily="34" charset="0"/>
+              <a:buChar char="•"/>
+            </a:pPr>
+            <a:r>
+              <a:rPr lang="uk-UA" sz="2400" dirty="0" smtClean="0">
+                <a:solidFill>
+                  <a:schemeClr val="bg1"/>
+                </a:solidFill>
+                <a:ea typeface="Times New Roman" panose="02020603050405020304" pitchFamily="18" charset="0"/>
+              </a:rPr>
+              <a:t>Процесор </a:t>
+            </a:r>
+            <a:r>
+              <a:rPr lang="en-US" sz="2400" dirty="0">
+                <a:solidFill>
+                  <a:schemeClr val="bg1"/>
+                </a:solidFill>
+                <a:ea typeface="Times New Roman" panose="02020603050405020304" pitchFamily="18" charset="0"/>
+              </a:rPr>
+              <a:t>Intel Celeron N3350;</a:t>
+            </a:r>
+          </a:p>
+          <a:p>
+            <a:pPr marL="342900" indent="-342900" algn="just">
+              <a:lnSpc>
+                <a:spcPct val="150000"/>
+              </a:lnSpc>
+              <a:spcAft>
+                <a:spcPts val="0"/>
+              </a:spcAft>
+              <a:buFont typeface="Arial" panose="020B0604020202020204" pitchFamily="34" charset="0"/>
+              <a:buChar char="•"/>
+            </a:pPr>
+            <a:r>
+              <a:rPr lang="uk-UA" sz="2400" dirty="0" smtClean="0">
+                <a:solidFill>
+                  <a:schemeClr val="bg1"/>
+                </a:solidFill>
+                <a:ea typeface="Times New Roman" panose="02020603050405020304" pitchFamily="18" charset="0"/>
+              </a:rPr>
+              <a:t>Монітор </a:t>
+            </a:r>
+            <a:r>
+              <a:rPr lang="uk-UA" sz="2400" dirty="0">
+                <a:solidFill>
+                  <a:schemeClr val="bg1"/>
+                </a:solidFill>
+                <a:ea typeface="Times New Roman" panose="02020603050405020304" pitchFamily="18" charset="0"/>
+              </a:rPr>
+              <a:t>11 дюймів;</a:t>
+            </a:r>
+          </a:p>
+          <a:p>
+            <a:pPr marL="342900" indent="-342900" algn="just">
+              <a:lnSpc>
+                <a:spcPct val="150000"/>
+              </a:lnSpc>
+              <a:spcAft>
+                <a:spcPts val="0"/>
+              </a:spcAft>
+              <a:buFont typeface="Arial" panose="020B0604020202020204" pitchFamily="34" charset="0"/>
+              <a:buChar char="•"/>
+            </a:pPr>
+            <a:r>
+              <a:rPr lang="uk-UA" sz="2400" dirty="0" smtClean="0">
+                <a:solidFill>
+                  <a:schemeClr val="bg1"/>
+                </a:solidFill>
+                <a:ea typeface="Times New Roman" panose="02020603050405020304" pitchFamily="18" charset="0"/>
+              </a:rPr>
+              <a:t>Відеоадаптер </a:t>
+            </a:r>
+            <a:r>
+              <a:rPr lang="en-US" sz="2400" dirty="0">
+                <a:solidFill>
+                  <a:schemeClr val="bg1"/>
+                </a:solidFill>
+                <a:ea typeface="Times New Roman" panose="02020603050405020304" pitchFamily="18" charset="0"/>
+              </a:rPr>
+              <a:t>Intel HD Graphics;</a:t>
+            </a:r>
+          </a:p>
+          <a:p>
+            <a:pPr marL="342900" indent="-342900" algn="just">
+              <a:lnSpc>
+                <a:spcPct val="150000"/>
+              </a:lnSpc>
+              <a:spcAft>
+                <a:spcPts val="0"/>
+              </a:spcAft>
+              <a:buFont typeface="Arial" panose="020B0604020202020204" pitchFamily="34" charset="0"/>
+              <a:buChar char="•"/>
+            </a:pPr>
+            <a:r>
+              <a:rPr lang="uk-UA" sz="2400" dirty="0" smtClean="0">
+                <a:solidFill>
+                  <a:schemeClr val="bg1"/>
+                </a:solidFill>
+                <a:ea typeface="Times New Roman" panose="02020603050405020304" pitchFamily="18" charset="0"/>
+              </a:rPr>
+              <a:t>Оперативна </a:t>
+            </a:r>
+            <a:r>
+              <a:rPr lang="uk-UA" sz="2400" dirty="0">
+                <a:solidFill>
+                  <a:schemeClr val="bg1"/>
+                </a:solidFill>
+                <a:ea typeface="Times New Roman" panose="02020603050405020304" pitchFamily="18" charset="0"/>
+              </a:rPr>
+              <a:t>пам’ять 4 </a:t>
+            </a:r>
+            <a:r>
+              <a:rPr lang="en-US" sz="2400" dirty="0">
+                <a:solidFill>
+                  <a:schemeClr val="bg1"/>
+                </a:solidFill>
+                <a:ea typeface="Times New Roman" panose="02020603050405020304" pitchFamily="18" charset="0"/>
+              </a:rPr>
+              <a:t>GB RAM;</a:t>
+            </a:r>
+          </a:p>
+          <a:p>
+            <a:pPr marL="342900" indent="-342900" algn="just">
+              <a:lnSpc>
+                <a:spcPct val="150000"/>
+              </a:lnSpc>
+              <a:spcAft>
+                <a:spcPts val="0"/>
+              </a:spcAft>
+              <a:buFont typeface="Arial" panose="020B0604020202020204" pitchFamily="34" charset="0"/>
+              <a:buChar char="•"/>
+            </a:pPr>
+            <a:r>
+              <a:rPr lang="uk-UA" sz="2400" dirty="0" smtClean="0">
+                <a:solidFill>
+                  <a:schemeClr val="bg1"/>
+                </a:solidFill>
+                <a:ea typeface="Times New Roman" panose="02020603050405020304" pitchFamily="18" charset="0"/>
+              </a:rPr>
+              <a:t>Накопичувач </a:t>
+            </a:r>
+            <a:r>
+              <a:rPr lang="en-US" sz="2400" dirty="0">
+                <a:solidFill>
+                  <a:schemeClr val="bg1"/>
+                </a:solidFill>
+                <a:ea typeface="Times New Roman" panose="02020603050405020304" pitchFamily="18" charset="0"/>
+              </a:rPr>
+              <a:t>HDD 500 GB;</a:t>
+            </a:r>
+          </a:p>
+          <a:p>
+            <a:pPr marL="342900" indent="-342900" algn="just">
+              <a:lnSpc>
+                <a:spcPct val="150000"/>
+              </a:lnSpc>
+              <a:spcAft>
+                <a:spcPts val="0"/>
+              </a:spcAft>
+              <a:buFont typeface="Arial" panose="020B0604020202020204" pitchFamily="34" charset="0"/>
+              <a:buChar char="•"/>
+            </a:pPr>
+            <a:r>
+              <a:rPr lang="uk-UA" sz="2400" dirty="0" smtClean="0">
+                <a:solidFill>
+                  <a:schemeClr val="bg1"/>
+                </a:solidFill>
+                <a:ea typeface="Times New Roman" panose="02020603050405020304" pitchFamily="18" charset="0"/>
+              </a:rPr>
+              <a:t>Клавіатура</a:t>
+            </a:r>
+            <a:r>
+              <a:rPr lang="uk-UA" sz="2400" dirty="0">
+                <a:solidFill>
+                  <a:schemeClr val="bg1"/>
+                </a:solidFill>
+                <a:ea typeface="Times New Roman" panose="02020603050405020304" pitchFamily="18" charset="0"/>
+              </a:rPr>
+              <a:t>, миша. </a:t>
+            </a:r>
+          </a:p>
+        </p:txBody>
+      </p:sp>
+    </p:spTree>
+    <p:extLst>
+      <p:ext uri="{BB962C8B-B14F-4D97-AF65-F5344CB8AC3E}">
+        <p14:creationId xmlns:p14="http://schemas.microsoft.com/office/powerpoint/2010/main" val="980941406"/>
+      </p:ext>
+    </p:extLst>
+  </p:cSld>
+  <p:clrMapOvr>
+    <a:masterClrMapping/>
+  </p:clrMapOvr>
+  <p:timing>
+    <p:tnLst>
+      <p:par>
+        <p:cTn id="1" dur="indefinite" restart="never" nodeType="tmRoot"/>
+      </p:par>
+    </p:tnLst>
+  </p:timing>
 </p:sld>
 </file>
 

</xml_diff>

<commit_message>
Diploma Presentation - 4
</commit_message>
<xml_diff>
--- a/Диплом_Бондарь.А.П._презентация.pptx
+++ b/Диплом_Бондарь.А.П._презентация.pptx
@@ -5898,8 +5898,8 @@
         </p:nvSpPr>
         <p:spPr>
           <a:xfrm>
-            <a:off x="403969" y="1781810"/>
-            <a:ext cx="8810839" cy="3416320"/>
+            <a:off x="6893977" y="2160951"/>
+            <a:ext cx="5193943" cy="3416320"/>
           </a:xfrm>
           <a:prstGeom prst="rect">
             <a:avLst/>
@@ -6098,6 +6098,414 @@
               </a:rPr>
               <a:t>, миша. </a:t>
             </a:r>
+          </a:p>
+        </p:txBody>
+      </p:sp>
+      <p:sp>
+        <p:nvSpPr>
+          <p:cNvPr id="6" name="Прямоугольник 5"/>
+          <p:cNvSpPr/>
+          <p:nvPr/>
+        </p:nvSpPr>
+        <p:spPr>
+          <a:xfrm>
+            <a:off x="500614" y="2160951"/>
+            <a:ext cx="5193943" cy="3416320"/>
+          </a:xfrm>
+          <a:prstGeom prst="rect">
+            <a:avLst/>
+          </a:prstGeom>
+        </p:spPr>
+        <p:txBody>
+          <a:bodyPr wrap="square">
+            <a:spAutoFit/>
+          </a:bodyPr>
+          <a:lstStyle/>
+          <a:p>
+            <a:pPr marL="342900" indent="-342900" algn="just">
+              <a:lnSpc>
+                <a:spcPct val="150000"/>
+              </a:lnSpc>
+              <a:spcAft>
+                <a:spcPts val="0"/>
+              </a:spcAft>
+              <a:buFont typeface="Arial" panose="020B0604020202020204" pitchFamily="34" charset="0"/>
+              <a:buChar char="•"/>
+            </a:pPr>
+            <a:r>
+              <a:rPr lang="uk-UA" sz="2400" dirty="0" smtClean="0">
+                <a:solidFill>
+                  <a:schemeClr val="bg1"/>
+                </a:solidFill>
+                <a:ea typeface="Times New Roman" panose="02020603050405020304" pitchFamily="18" charset="0"/>
+              </a:rPr>
+              <a:t>Процесор </a:t>
+            </a:r>
+            <a:r>
+              <a:rPr lang="en-US" sz="2400" dirty="0" smtClean="0">
+                <a:solidFill>
+                  <a:schemeClr val="bg1"/>
+                </a:solidFill>
+                <a:ea typeface="Times New Roman" panose="02020603050405020304" pitchFamily="18" charset="0"/>
+              </a:rPr>
+              <a:t>AMD FX-4100;</a:t>
+            </a:r>
+            <a:endParaRPr lang="en-US" sz="2400" dirty="0">
+              <a:solidFill>
+                <a:schemeClr val="bg1"/>
+              </a:solidFill>
+              <a:ea typeface="Times New Roman" panose="02020603050405020304" pitchFamily="18" charset="0"/>
+            </a:endParaRPr>
+          </a:p>
+          <a:p>
+            <a:pPr marL="342900" indent="-342900" algn="just">
+              <a:lnSpc>
+                <a:spcPct val="150000"/>
+              </a:lnSpc>
+              <a:spcAft>
+                <a:spcPts val="0"/>
+              </a:spcAft>
+              <a:buFont typeface="Arial" panose="020B0604020202020204" pitchFamily="34" charset="0"/>
+              <a:buChar char="•"/>
+            </a:pPr>
+            <a:r>
+              <a:rPr lang="uk-UA" sz="2400" dirty="0" smtClean="0">
+                <a:solidFill>
+                  <a:schemeClr val="bg1"/>
+                </a:solidFill>
+                <a:ea typeface="Times New Roman" panose="02020603050405020304" pitchFamily="18" charset="0"/>
+              </a:rPr>
+              <a:t>Монітор 20 дюймів </a:t>
+            </a:r>
+            <a:r>
+              <a:rPr lang="en-US" sz="2400" dirty="0">
+                <a:solidFill>
+                  <a:schemeClr val="bg1"/>
+                </a:solidFill>
+                <a:ea typeface="Times New Roman" panose="02020603050405020304" pitchFamily="18" charset="0"/>
+              </a:rPr>
+              <a:t>Asus VE208N</a:t>
+            </a:r>
+            <a:r>
+              <a:rPr lang="uk-UA" sz="2400" dirty="0" smtClean="0">
+                <a:solidFill>
+                  <a:schemeClr val="bg1"/>
+                </a:solidFill>
+                <a:ea typeface="Times New Roman" panose="02020603050405020304" pitchFamily="18" charset="0"/>
+              </a:rPr>
+              <a:t>;</a:t>
+            </a:r>
+          </a:p>
+          <a:p>
+            <a:pPr marL="342900" indent="-342900" algn="just">
+              <a:lnSpc>
+                <a:spcPct val="150000"/>
+              </a:lnSpc>
+              <a:spcAft>
+                <a:spcPts val="0"/>
+              </a:spcAft>
+              <a:buFont typeface="Arial" panose="020B0604020202020204" pitchFamily="34" charset="0"/>
+              <a:buChar char="•"/>
+            </a:pPr>
+            <a:r>
+              <a:rPr lang="uk-UA" sz="2400" dirty="0" smtClean="0">
+                <a:solidFill>
+                  <a:schemeClr val="bg1"/>
+                </a:solidFill>
+                <a:ea typeface="Times New Roman" panose="02020603050405020304" pitchFamily="18" charset="0"/>
+              </a:rPr>
+              <a:t>Відеоадаптер </a:t>
+            </a:r>
+            <a:r>
+              <a:rPr lang="en-US" sz="2400" dirty="0" err="1" smtClean="0">
+                <a:solidFill>
+                  <a:schemeClr val="bg1"/>
+                </a:solidFill>
+                <a:ea typeface="Times New Roman" panose="02020603050405020304" pitchFamily="18" charset="0"/>
+              </a:rPr>
+              <a:t>Nvidia</a:t>
+            </a:r>
+            <a:r>
+              <a:rPr lang="en-US" sz="2400" dirty="0" smtClean="0">
+                <a:solidFill>
+                  <a:schemeClr val="bg1"/>
+                </a:solidFill>
+                <a:ea typeface="Times New Roman" panose="02020603050405020304" pitchFamily="18" charset="0"/>
+              </a:rPr>
+              <a:t> GeForce 520;</a:t>
+            </a:r>
+            <a:endParaRPr lang="en-US" sz="2400" dirty="0">
+              <a:solidFill>
+                <a:schemeClr val="bg1"/>
+              </a:solidFill>
+              <a:ea typeface="Times New Roman" panose="02020603050405020304" pitchFamily="18" charset="0"/>
+            </a:endParaRPr>
+          </a:p>
+          <a:p>
+            <a:pPr marL="342900" indent="-342900" algn="just">
+              <a:lnSpc>
+                <a:spcPct val="150000"/>
+              </a:lnSpc>
+              <a:spcAft>
+                <a:spcPts val="0"/>
+              </a:spcAft>
+              <a:buFont typeface="Arial" panose="020B0604020202020204" pitchFamily="34" charset="0"/>
+              <a:buChar char="•"/>
+            </a:pPr>
+            <a:r>
+              <a:rPr lang="uk-UA" sz="2400" dirty="0" smtClean="0">
+                <a:solidFill>
+                  <a:schemeClr val="bg1"/>
+                </a:solidFill>
+                <a:ea typeface="Times New Roman" panose="02020603050405020304" pitchFamily="18" charset="0"/>
+              </a:rPr>
+              <a:t>Оперативна </a:t>
+            </a:r>
+            <a:r>
+              <a:rPr lang="uk-UA" sz="2400" dirty="0">
+                <a:solidFill>
+                  <a:schemeClr val="bg1"/>
+                </a:solidFill>
+                <a:ea typeface="Times New Roman" panose="02020603050405020304" pitchFamily="18" charset="0"/>
+              </a:rPr>
+              <a:t>пам’ять </a:t>
+            </a:r>
+            <a:r>
+              <a:rPr lang="en-US" sz="2400" dirty="0" smtClean="0">
+                <a:solidFill>
+                  <a:schemeClr val="bg1"/>
+                </a:solidFill>
+                <a:ea typeface="Times New Roman" panose="02020603050405020304" pitchFamily="18" charset="0"/>
+              </a:rPr>
+              <a:t>16</a:t>
+            </a:r>
+            <a:r>
+              <a:rPr lang="uk-UA" sz="2400" dirty="0" smtClean="0">
+                <a:solidFill>
+                  <a:schemeClr val="bg1"/>
+                </a:solidFill>
+                <a:ea typeface="Times New Roman" panose="02020603050405020304" pitchFamily="18" charset="0"/>
+              </a:rPr>
+              <a:t> </a:t>
+            </a:r>
+            <a:r>
+              <a:rPr lang="en-US" sz="2400" dirty="0">
+                <a:solidFill>
+                  <a:schemeClr val="bg1"/>
+                </a:solidFill>
+                <a:ea typeface="Times New Roman" panose="02020603050405020304" pitchFamily="18" charset="0"/>
+              </a:rPr>
+              <a:t>GB RAM;</a:t>
+            </a:r>
+          </a:p>
+          <a:p>
+            <a:pPr marL="342900" indent="-342900" algn="just">
+              <a:lnSpc>
+                <a:spcPct val="150000"/>
+              </a:lnSpc>
+              <a:spcAft>
+                <a:spcPts val="0"/>
+              </a:spcAft>
+              <a:buFont typeface="Arial" panose="020B0604020202020204" pitchFamily="34" charset="0"/>
+              <a:buChar char="•"/>
+            </a:pPr>
+            <a:r>
+              <a:rPr lang="uk-UA" sz="2400" dirty="0" smtClean="0">
+                <a:solidFill>
+                  <a:schemeClr val="bg1"/>
+                </a:solidFill>
+                <a:ea typeface="Times New Roman" panose="02020603050405020304" pitchFamily="18" charset="0"/>
+              </a:rPr>
+              <a:t>Накопичувач </a:t>
+            </a:r>
+            <a:r>
+              <a:rPr lang="en-US" sz="2400" dirty="0" smtClean="0">
+                <a:solidFill>
+                  <a:schemeClr val="bg1"/>
+                </a:solidFill>
+                <a:ea typeface="Times New Roman" panose="02020603050405020304" pitchFamily="18" charset="0"/>
+              </a:rPr>
+              <a:t>SSD 240 </a:t>
+            </a:r>
+            <a:r>
+              <a:rPr lang="en-US" sz="2400" dirty="0">
+                <a:solidFill>
+                  <a:schemeClr val="bg1"/>
+                </a:solidFill>
+                <a:ea typeface="Times New Roman" panose="02020603050405020304" pitchFamily="18" charset="0"/>
+              </a:rPr>
+              <a:t>GB;</a:t>
+            </a:r>
+          </a:p>
+          <a:p>
+            <a:pPr marL="342900" indent="-342900" algn="just">
+              <a:lnSpc>
+                <a:spcPct val="150000"/>
+              </a:lnSpc>
+              <a:spcAft>
+                <a:spcPts val="0"/>
+              </a:spcAft>
+              <a:buFont typeface="Arial" panose="020B0604020202020204" pitchFamily="34" charset="0"/>
+              <a:buChar char="•"/>
+            </a:pPr>
+            <a:r>
+              <a:rPr lang="uk-UA" sz="2400" dirty="0" smtClean="0">
+                <a:solidFill>
+                  <a:schemeClr val="bg1"/>
+                </a:solidFill>
+                <a:ea typeface="Times New Roman" panose="02020603050405020304" pitchFamily="18" charset="0"/>
+              </a:rPr>
+              <a:t>Клавіатура</a:t>
+            </a:r>
+            <a:r>
+              <a:rPr lang="uk-UA" sz="2400" dirty="0">
+                <a:solidFill>
+                  <a:schemeClr val="bg1"/>
+                </a:solidFill>
+                <a:ea typeface="Times New Roman" panose="02020603050405020304" pitchFamily="18" charset="0"/>
+              </a:rPr>
+              <a:t>, миша. </a:t>
+            </a:r>
+          </a:p>
+        </p:txBody>
+      </p:sp>
+      <p:sp>
+        <p:nvSpPr>
+          <p:cNvPr id="7" name="Rectangle 11">
+            <a:extLst>
+              <a:ext uri="{FF2B5EF4-FFF2-40B4-BE49-F238E27FC236}">
+                <a16:creationId xmlns:a16="http://schemas.microsoft.com/office/drawing/2014/main" id="{6601C6B5-FE1B-4D30-AAE7-B15C74BB80D2}"/>
+              </a:ext>
+            </a:extLst>
+          </p:cNvPr>
+          <p:cNvSpPr>
+            <a:spLocks noChangeArrowheads="1"/>
+          </p:cNvSpPr>
+          <p:nvPr/>
+        </p:nvSpPr>
+        <p:spPr bwMode="auto">
+          <a:xfrm>
+            <a:off x="1556279" y="1425414"/>
+            <a:ext cx="3082611" cy="523220"/>
+          </a:xfrm>
+          <a:prstGeom prst="rect">
+            <a:avLst/>
+          </a:prstGeom>
+          <a:noFill/>
+          <a:ln w="9525">
+            <a:noFill/>
+            <a:miter lim="800000"/>
+            <a:headEnd/>
+            <a:tailEnd/>
+          </a:ln>
+          <a:effectLst>
+            <a:outerShdw blurRad="50800" dist="38100" dir="2700000" algn="tl" rotWithShape="0">
+              <a:prstClr val="black">
+                <a:alpha val="40000"/>
+              </a:prstClr>
+            </a:outerShdw>
+          </a:effectLst>
+        </p:spPr>
+        <p:txBody>
+          <a:bodyPr wrap="square">
+            <a:spAutoFit/>
+          </a:bodyPr>
+          <a:lstStyle/>
+          <a:p>
+            <a:pPr algn="ctr">
+              <a:defRPr/>
+            </a:pPr>
+            <a:r>
+              <a:rPr lang="ru-RU" sz="2800" dirty="0" smtClean="0">
+                <a:solidFill>
+                  <a:schemeClr val="bg1"/>
+                </a:solidFill>
+              </a:rPr>
+              <a:t>ПК </a:t>
+            </a:r>
+            <a:r>
+              <a:rPr lang="ru-RU" sz="2800" dirty="0" err="1" smtClean="0">
+                <a:solidFill>
+                  <a:schemeClr val="bg1"/>
+                </a:solidFill>
+              </a:rPr>
+              <a:t>розробки</a:t>
+            </a:r>
+            <a:endParaRPr lang="ru-RU" sz="2800" dirty="0" smtClean="0">
+              <a:solidFill>
+                <a:schemeClr val="bg1"/>
+              </a:solidFill>
+            </a:endParaRPr>
+          </a:p>
+        </p:txBody>
+      </p:sp>
+      <p:sp>
+        <p:nvSpPr>
+          <p:cNvPr id="8" name="Rectangle 11">
+            <a:extLst>
+              <a:ext uri="{FF2B5EF4-FFF2-40B4-BE49-F238E27FC236}">
+                <a16:creationId xmlns:a16="http://schemas.microsoft.com/office/drawing/2014/main" id="{6601C6B5-FE1B-4D30-AAE7-B15C74BB80D2}"/>
+              </a:ext>
+            </a:extLst>
+          </p:cNvPr>
+          <p:cNvSpPr>
+            <a:spLocks noChangeArrowheads="1"/>
+          </p:cNvSpPr>
+          <p:nvPr/>
+        </p:nvSpPr>
+        <p:spPr bwMode="auto">
+          <a:xfrm>
+            <a:off x="7949644" y="1326690"/>
+            <a:ext cx="3082611" cy="523220"/>
+          </a:xfrm>
+          <a:prstGeom prst="rect">
+            <a:avLst/>
+          </a:prstGeom>
+          <a:noFill/>
+          <a:ln w="9525">
+            <a:noFill/>
+            <a:miter lim="800000"/>
+            <a:headEnd/>
+            <a:tailEnd/>
+          </a:ln>
+          <a:effectLst>
+            <a:outerShdw blurRad="50800" dist="38100" dir="2700000" algn="tl" rotWithShape="0">
+              <a:prstClr val="black">
+                <a:alpha val="40000"/>
+              </a:prstClr>
+            </a:outerShdw>
+          </a:effectLst>
+        </p:spPr>
+        <p:txBody>
+          <a:bodyPr wrap="square">
+            <a:spAutoFit/>
+          </a:bodyPr>
+          <a:lstStyle/>
+          <a:p>
+            <a:pPr algn="ctr">
+              <a:defRPr/>
+            </a:pPr>
+            <a:r>
+              <a:rPr lang="ru-RU" sz="2800" dirty="0" smtClean="0">
+                <a:solidFill>
+                  <a:schemeClr val="bg1"/>
+                </a:solidFill>
+              </a:rPr>
+              <a:t>ПК </a:t>
+            </a:r>
+            <a:r>
+              <a:rPr lang="ru-RU" sz="2800" dirty="0" err="1" smtClean="0">
+                <a:solidFill>
+                  <a:schemeClr val="bg1"/>
+                </a:solidFill>
+              </a:rPr>
+              <a:t>тестування</a:t>
+            </a:r>
+            <a:endParaRPr lang="ru-RU" sz="2800" dirty="0" smtClean="0">
+              <a:solidFill>
+                <a:schemeClr val="bg1"/>
+              </a:solidFill>
+            </a:endParaRPr>
           </a:p>
         </p:txBody>
       </p:sp>

</xml_diff>